<commit_message>
Updated the last slide to use imagery rather than technical language. Used a description to describe the intersection between publishers and suppliers, demoting the CSP code example.
</commit_message>
<xml_diff>
--- a/Overview.pptx
+++ b/Overview.pptx
@@ -121,343 +121,93 @@
 </p:presentation>
 </file>
 
+<file path=ppt/revisionInfo.xml><?xml version="1.0" encoding="utf-8"?>
+<p1510:revInfo xmlns:a="http://schemas.openxmlformats.org/drawingml/2006/main" xmlns:r="http://schemas.openxmlformats.org/officeDocument/2006/relationships" xmlns:p1510="http://schemas.microsoft.com/office/powerpoint/2015/10/main">
+  <p1510:revLst>
+    <p1510:client id="{083B3D2E-55E6-4910-8E5F-477CC1A02799}" v="8" dt="2025-06-12T12:55:42.519"/>
+  </p1510:revLst>
+</p1510:revInfo>
+</file>
+
 <file path=ppt/changesInfos/changesInfo1.xml><?xml version="1.0" encoding="utf-8"?>
 <pc:chgInfo xmlns:a="http://schemas.openxmlformats.org/drawingml/2006/main" xmlns:r="http://schemas.openxmlformats.org/officeDocument/2006/relationships" xmlns:ac="http://schemas.microsoft.com/office/drawing/2013/main/command" xmlns:pc="http://schemas.microsoft.com/office/powerpoint/2013/main/command">
   <pc:docChgLst>
-    <pc:chgData name="James Rosewell" userId="8550b6d2-134f-42e0-828f-eea3d9912a03" providerId="ADAL" clId="{ED8145C6-8837-4E61-BE75-6E990B7C7A62}"/>
-    <pc:docChg chg="undo custSel addSld delSld modSld sldOrd">
-      <pc:chgData name="James Rosewell" userId="8550b6d2-134f-42e0-828f-eea3d9912a03" providerId="ADAL" clId="{ED8145C6-8837-4E61-BE75-6E990B7C7A62}" dt="2025-05-28T14:55:05.047" v="2666" actId="20577"/>
+    <pc:chgData name="James Rosewell" userId="8550b6d2-134f-42e0-828f-eea3d9912a03" providerId="ADAL" clId="{083B3D2E-55E6-4910-8E5F-477CC1A02799}"/>
+    <pc:docChg chg="undo custSel addSld delSld modSld modMainMaster">
+      <pc:chgData name="James Rosewell" userId="8550b6d2-134f-42e0-828f-eea3d9912a03" providerId="ADAL" clId="{083B3D2E-55E6-4910-8E5F-477CC1A02799}" dt="2025-06-12T13:38:46.030" v="306" actId="20577"/>
       <pc:docMkLst>
         <pc:docMk/>
       </pc:docMkLst>
-      <pc:sldChg chg="modSp mod">
-        <pc:chgData name="James Rosewell" userId="8550b6d2-134f-42e0-828f-eea3d9912a03" providerId="ADAL" clId="{ED8145C6-8837-4E61-BE75-6E990B7C7A62}" dt="2025-05-28T14:53:47.231" v="2631" actId="20577"/>
+      <pc:sldChg chg="addSp delSp modSp mod">
+        <pc:chgData name="James Rosewell" userId="8550b6d2-134f-42e0-828f-eea3d9912a03" providerId="ADAL" clId="{083B3D2E-55E6-4910-8E5F-477CC1A02799}" dt="2025-06-12T13:38:46.030" v="306" actId="20577"/>
         <pc:sldMkLst>
           <pc:docMk/>
           <pc:sldMk cId="1488691487" sldId="256"/>
         </pc:sldMkLst>
         <pc:spChg chg="mod">
-          <ac:chgData name="James Rosewell" userId="8550b6d2-134f-42e0-828f-eea3d9912a03" providerId="ADAL" clId="{ED8145C6-8837-4E61-BE75-6E990B7C7A62}" dt="2025-05-28T14:53:47.231" v="2631" actId="20577"/>
-          <ac:spMkLst>
-            <pc:docMk/>
-            <pc:sldMk cId="1488691487" sldId="256"/>
-            <ac:spMk id="2" creationId="{7617B840-C5CD-D438-685A-2D20E3ADBF0C}"/>
-          </ac:spMkLst>
-        </pc:spChg>
-        <pc:spChg chg="mod">
-          <ac:chgData name="James Rosewell" userId="8550b6d2-134f-42e0-828f-eea3d9912a03" providerId="ADAL" clId="{ED8145C6-8837-4E61-BE75-6E990B7C7A62}" dt="2025-05-26T19:33:34.465" v="26" actId="5793"/>
+          <ac:chgData name="James Rosewell" userId="8550b6d2-134f-42e0-828f-eea3d9912a03" providerId="ADAL" clId="{083B3D2E-55E6-4910-8E5F-477CC1A02799}" dt="2025-06-12T13:38:46.030" v="306" actId="20577"/>
           <ac:spMkLst>
             <pc:docMk/>
             <pc:sldMk cId="1488691487" sldId="256"/>
             <ac:spMk id="3" creationId="{244F2792-042F-5A67-DED0-2DB15A43A788}"/>
           </ac:spMkLst>
         </pc:spChg>
-      </pc:sldChg>
-      <pc:sldChg chg="addSp delSp modSp new mod modAnim">
-        <pc:chgData name="James Rosewell" userId="8550b6d2-134f-42e0-828f-eea3d9912a03" providerId="ADAL" clId="{ED8145C6-8837-4E61-BE75-6E990B7C7A62}" dt="2025-05-28T14:54:15.710" v="2662" actId="20577"/>
-        <pc:sldMkLst>
-          <pc:docMk/>
-          <pc:sldMk cId="2454474999" sldId="257"/>
-        </pc:sldMkLst>
-        <pc:spChg chg="add mod">
-          <ac:chgData name="James Rosewell" userId="8550b6d2-134f-42e0-828f-eea3d9912a03" providerId="ADAL" clId="{ED8145C6-8837-4E61-BE75-6E990B7C7A62}" dt="2025-05-28T14:54:13.080" v="2657" actId="20577"/>
+        <pc:spChg chg="add del mod">
+          <ac:chgData name="James Rosewell" userId="8550b6d2-134f-42e0-828f-eea3d9912a03" providerId="ADAL" clId="{083B3D2E-55E6-4910-8E5F-477CC1A02799}" dt="2025-06-12T12:52:54.663" v="203" actId="21"/>
           <ac:spMkLst>
             <pc:docMk/>
-            <pc:sldMk cId="2454474999" sldId="257"/>
-            <ac:spMk id="10" creationId="{C98A1EE4-E61F-290C-6850-27BA4E9C2B49}"/>
-          </ac:spMkLst>
-        </pc:spChg>
-        <pc:spChg chg="add mod">
-          <ac:chgData name="James Rosewell" userId="8550b6d2-134f-42e0-828f-eea3d9912a03" providerId="ADAL" clId="{ED8145C6-8837-4E61-BE75-6E990B7C7A62}" dt="2025-05-28T14:54:15.710" v="2662" actId="20577"/>
-          <ac:spMkLst>
-            <pc:docMk/>
-            <pc:sldMk cId="2454474999" sldId="257"/>
-            <ac:spMk id="11" creationId="{FF2F246A-5349-1D61-7552-BA428DEBE91E}"/>
-          </ac:spMkLst>
-        </pc:spChg>
-        <pc:picChg chg="add mod">
-          <ac:chgData name="James Rosewell" userId="8550b6d2-134f-42e0-828f-eea3d9912a03" providerId="ADAL" clId="{ED8145C6-8837-4E61-BE75-6E990B7C7A62}" dt="2025-05-26T19:43:09.100" v="204" actId="1076"/>
-          <ac:picMkLst>
-            <pc:docMk/>
-            <pc:sldMk cId="2454474999" sldId="257"/>
-            <ac:picMk id="3" creationId="{C7CE0EA8-C3C4-D007-DE70-8244B045C67B}"/>
-          </ac:picMkLst>
-        </pc:picChg>
-      </pc:sldChg>
-      <pc:sldChg chg="addSp delSp modSp new del mod delAnim modAnim">
-        <pc:chgData name="James Rosewell" userId="8550b6d2-134f-42e0-828f-eea3d9912a03" providerId="ADAL" clId="{ED8145C6-8837-4E61-BE75-6E990B7C7A62}" dt="2025-05-26T19:48:33.957" v="449" actId="47"/>
-        <pc:sldMkLst>
-          <pc:docMk/>
-          <pc:sldMk cId="316886100" sldId="258"/>
-        </pc:sldMkLst>
-      </pc:sldChg>
-      <pc:sldChg chg="addSp delSp modSp new mod ord modAnim">
-        <pc:chgData name="James Rosewell" userId="8550b6d2-134f-42e0-828f-eea3d9912a03" providerId="ADAL" clId="{ED8145C6-8837-4E61-BE75-6E990B7C7A62}" dt="2025-05-28T14:54:00.477" v="2647" actId="1076"/>
-        <pc:sldMkLst>
-          <pc:docMk/>
-          <pc:sldMk cId="3013729455" sldId="259"/>
-        </pc:sldMkLst>
-        <pc:spChg chg="mod">
-          <ac:chgData name="James Rosewell" userId="8550b6d2-134f-42e0-828f-eea3d9912a03" providerId="ADAL" clId="{ED8145C6-8837-4E61-BE75-6E990B7C7A62}" dt="2025-05-26T19:36:45.553" v="53" actId="20577"/>
-          <ac:spMkLst>
-            <pc:docMk/>
-            <pc:sldMk cId="3013729455" sldId="259"/>
-            <ac:spMk id="2" creationId="{019C4C23-3D22-326F-C996-98230098F41A}"/>
-          </ac:spMkLst>
-        </pc:spChg>
-        <pc:spChg chg="add mod">
-          <ac:chgData name="James Rosewell" userId="8550b6d2-134f-42e0-828f-eea3d9912a03" providerId="ADAL" clId="{ED8145C6-8837-4E61-BE75-6E990B7C7A62}" dt="2025-05-26T19:38:44.632" v="106" actId="164"/>
-          <ac:spMkLst>
-            <pc:docMk/>
-            <pc:sldMk cId="3013729455" sldId="259"/>
-            <ac:spMk id="7" creationId="{E1E88CAA-0E36-95E2-3E1D-BEEAE3D2C140}"/>
-          </ac:spMkLst>
-        </pc:spChg>
-        <pc:spChg chg="add mod">
-          <ac:chgData name="James Rosewell" userId="8550b6d2-134f-42e0-828f-eea3d9912a03" providerId="ADAL" clId="{ED8145C6-8837-4E61-BE75-6E990B7C7A62}" dt="2025-05-28T14:54:00.477" v="2647" actId="1076"/>
-          <ac:spMkLst>
-            <pc:docMk/>
-            <pc:sldMk cId="3013729455" sldId="259"/>
-            <ac:spMk id="10" creationId="{6F633549-92C7-4E3E-A9CD-C93644A0B6E6}"/>
-          </ac:spMkLst>
-        </pc:spChg>
-        <pc:spChg chg="add mod">
-          <ac:chgData name="James Rosewell" userId="8550b6d2-134f-42e0-828f-eea3d9912a03" providerId="ADAL" clId="{ED8145C6-8837-4E61-BE75-6E990B7C7A62}" dt="2025-05-26T19:40:55.610" v="151" actId="1076"/>
-          <ac:spMkLst>
-            <pc:docMk/>
-            <pc:sldMk cId="3013729455" sldId="259"/>
-            <ac:spMk id="15" creationId="{507D4A9B-B4E3-7472-63E8-15B961BEB1D4}"/>
-          </ac:spMkLst>
-        </pc:spChg>
-        <pc:spChg chg="add mod">
-          <ac:chgData name="James Rosewell" userId="8550b6d2-134f-42e0-828f-eea3d9912a03" providerId="ADAL" clId="{ED8145C6-8837-4E61-BE75-6E990B7C7A62}" dt="2025-05-26T19:40:59.595" v="152" actId="1076"/>
-          <ac:spMkLst>
-            <pc:docMk/>
-            <pc:sldMk cId="3013729455" sldId="259"/>
-            <ac:spMk id="16" creationId="{2E3F8A2E-F1EE-0D46-B9B5-CBF59A5A50D7}"/>
-          </ac:spMkLst>
-        </pc:spChg>
-        <pc:grpChg chg="add mod">
-          <ac:chgData name="James Rosewell" userId="8550b6d2-134f-42e0-828f-eea3d9912a03" providerId="ADAL" clId="{ED8145C6-8837-4E61-BE75-6E990B7C7A62}" dt="2025-05-26T19:39:00.234" v="109" actId="1076"/>
-          <ac:grpSpMkLst>
-            <pc:docMk/>
-            <pc:sldMk cId="3013729455" sldId="259"/>
-            <ac:grpSpMk id="12" creationId="{90FC1CD7-94EA-4E62-09A3-7658FCAFB65B}"/>
-          </ac:grpSpMkLst>
-        </pc:grpChg>
-        <pc:grpChg chg="add mod">
-          <ac:chgData name="James Rosewell" userId="8550b6d2-134f-42e0-828f-eea3d9912a03" providerId="ADAL" clId="{ED8145C6-8837-4E61-BE75-6E990B7C7A62}" dt="2025-05-26T19:39:00.234" v="109" actId="1076"/>
-          <ac:grpSpMkLst>
-            <pc:docMk/>
-            <pc:sldMk cId="3013729455" sldId="259"/>
-            <ac:grpSpMk id="13" creationId="{A30B2D29-AF8C-F418-D401-C9F555C55D37}"/>
-          </ac:grpSpMkLst>
-        </pc:grpChg>
-        <pc:picChg chg="add mod">
-          <ac:chgData name="James Rosewell" userId="8550b6d2-134f-42e0-828f-eea3d9912a03" providerId="ADAL" clId="{ED8145C6-8837-4E61-BE75-6E990B7C7A62}" dt="2025-05-26T19:39:00.234" v="109" actId="1076"/>
-          <ac:picMkLst>
-            <pc:docMk/>
-            <pc:sldMk cId="3013729455" sldId="259"/>
-            <ac:picMk id="3" creationId="{5BC61FAA-562F-95E9-44DD-E1143CCF7300}"/>
-          </ac:picMkLst>
-        </pc:picChg>
-        <pc:cxnChg chg="add mod">
-          <ac:chgData name="James Rosewell" userId="8550b6d2-134f-42e0-828f-eea3d9912a03" providerId="ADAL" clId="{ED8145C6-8837-4E61-BE75-6E990B7C7A62}" dt="2025-05-26T19:38:44.632" v="106" actId="164"/>
-          <ac:cxnSpMkLst>
-            <pc:docMk/>
-            <pc:sldMk cId="3013729455" sldId="259"/>
-            <ac:cxnSpMk id="5" creationId="{95F2244F-0153-1ED1-919A-589F7C345BB9}"/>
-          </ac:cxnSpMkLst>
-        </pc:cxnChg>
-        <pc:cxnChg chg="add mod">
-          <ac:chgData name="James Rosewell" userId="8550b6d2-134f-42e0-828f-eea3d9912a03" providerId="ADAL" clId="{ED8145C6-8837-4E61-BE75-6E990B7C7A62}" dt="2025-05-26T19:38:51.995" v="108" actId="164"/>
-          <ac:cxnSpMkLst>
-            <pc:docMk/>
-            <pc:sldMk cId="3013729455" sldId="259"/>
-            <ac:cxnSpMk id="8" creationId="{EF8AF2CE-55C9-1CDC-8216-D3033DA6D192}"/>
-          </ac:cxnSpMkLst>
-        </pc:cxnChg>
-      </pc:sldChg>
-      <pc:sldChg chg="addSp modSp new mod modAnim">
-        <pc:chgData name="James Rosewell" userId="8550b6d2-134f-42e0-828f-eea3d9912a03" providerId="ADAL" clId="{ED8145C6-8837-4E61-BE75-6E990B7C7A62}" dt="2025-05-28T14:54:09.176" v="2652" actId="20577"/>
-        <pc:sldMkLst>
-          <pc:docMk/>
-          <pc:sldMk cId="4054774228" sldId="260"/>
-        </pc:sldMkLst>
-        <pc:spChg chg="mod">
-          <ac:chgData name="James Rosewell" userId="8550b6d2-134f-42e0-828f-eea3d9912a03" providerId="ADAL" clId="{ED8145C6-8837-4E61-BE75-6E990B7C7A62}" dt="2025-05-26T19:42:46.318" v="200" actId="20577"/>
-          <ac:spMkLst>
-            <pc:docMk/>
-            <pc:sldMk cId="4054774228" sldId="260"/>
-            <ac:spMk id="2" creationId="{0570C1DE-78C5-8A33-7AEB-4173B83E2FEA}"/>
-          </ac:spMkLst>
-        </pc:spChg>
-        <pc:spChg chg="add mod">
-          <ac:chgData name="James Rosewell" userId="8550b6d2-134f-42e0-828f-eea3d9912a03" providerId="ADAL" clId="{ED8145C6-8837-4E61-BE75-6E990B7C7A62}" dt="2025-05-28T14:54:09.176" v="2652" actId="20577"/>
-          <ac:spMkLst>
-            <pc:docMk/>
-            <pc:sldMk cId="4054774228" sldId="260"/>
-            <ac:spMk id="3" creationId="{5EBF109E-4B35-BFEF-1923-1D6E7DFA37EF}"/>
-          </ac:spMkLst>
-        </pc:spChg>
-        <pc:picChg chg="add mod">
-          <ac:chgData name="James Rosewell" userId="8550b6d2-134f-42e0-828f-eea3d9912a03" providerId="ADAL" clId="{ED8145C6-8837-4E61-BE75-6E990B7C7A62}" dt="2025-05-26T19:42:07.654" v="187" actId="1076"/>
-          <ac:picMkLst>
-            <pc:docMk/>
-            <pc:sldMk cId="4054774228" sldId="260"/>
-            <ac:picMk id="9" creationId="{38817D04-F28D-7EC3-0C5D-6F0F62D1254A}"/>
-          </ac:picMkLst>
-        </pc:picChg>
-      </pc:sldChg>
-      <pc:sldChg chg="addSp modSp new mod modAnim">
-        <pc:chgData name="James Rosewell" userId="8550b6d2-134f-42e0-828f-eea3d9912a03" providerId="ADAL" clId="{ED8145C6-8837-4E61-BE75-6E990B7C7A62}" dt="2025-05-28T14:54:44.670" v="2664"/>
-        <pc:sldMkLst>
-          <pc:docMk/>
-          <pc:sldMk cId="1477550484" sldId="261"/>
-        </pc:sldMkLst>
-        <pc:spChg chg="mod">
-          <ac:chgData name="James Rosewell" userId="8550b6d2-134f-42e0-828f-eea3d9912a03" providerId="ADAL" clId="{ED8145C6-8837-4E61-BE75-6E990B7C7A62}" dt="2025-05-26T19:53:00.334" v="654" actId="20577"/>
-          <ac:spMkLst>
-            <pc:docMk/>
-            <pc:sldMk cId="1477550484" sldId="261"/>
-            <ac:spMk id="2" creationId="{0D88CD46-0073-B9AF-57F1-593EBB800C3C}"/>
-          </ac:spMkLst>
-        </pc:spChg>
-        <pc:spChg chg="add mod">
-          <ac:chgData name="James Rosewell" userId="8550b6d2-134f-42e0-828f-eea3d9912a03" providerId="ADAL" clId="{ED8145C6-8837-4E61-BE75-6E990B7C7A62}" dt="2025-05-28T14:54:44.670" v="2664"/>
-          <ac:spMkLst>
-            <pc:docMk/>
-            <pc:sldMk cId="1477550484" sldId="261"/>
-            <ac:spMk id="4" creationId="{86DC5A7F-9F1E-B2A5-CC10-1FA18C67C7CA}"/>
-          </ac:spMkLst>
-        </pc:spChg>
-        <pc:spChg chg="add mod">
-          <ac:chgData name="James Rosewell" userId="8550b6d2-134f-42e0-828f-eea3d9912a03" providerId="ADAL" clId="{ED8145C6-8837-4E61-BE75-6E990B7C7A62}" dt="2025-05-28T14:54:44.670" v="2664"/>
-          <ac:spMkLst>
-            <pc:docMk/>
-            <pc:sldMk cId="1477550484" sldId="261"/>
-            <ac:spMk id="5" creationId="{3F776308-C373-C33C-AB1C-F33F9FC80B0B}"/>
+            <pc:sldMk cId="1488691487" sldId="256"/>
+            <ac:spMk id="5" creationId="{DC1A8E4C-AC58-1BF6-B8E4-1486456CDBB2}"/>
           </ac:spMkLst>
         </pc:spChg>
       </pc:sldChg>
-      <pc:sldChg chg="addSp modSp new mod modAnim">
-        <pc:chgData name="James Rosewell" userId="8550b6d2-134f-42e0-828f-eea3d9912a03" providerId="ADAL" clId="{ED8145C6-8837-4E61-BE75-6E990B7C7A62}" dt="2025-05-28T14:54:55.711" v="2665"/>
+      <pc:sldChg chg="modSp mod">
+        <pc:chgData name="James Rosewell" userId="8550b6d2-134f-42e0-828f-eea3d9912a03" providerId="ADAL" clId="{083B3D2E-55E6-4910-8E5F-477CC1A02799}" dt="2025-06-12T12:53:29.491" v="219" actId="1035"/>
         <pc:sldMkLst>
           <pc:docMk/>
           <pc:sldMk cId="2466774629" sldId="262"/>
         </pc:sldMkLst>
         <pc:spChg chg="mod">
-          <ac:chgData name="James Rosewell" userId="8550b6d2-134f-42e0-828f-eea3d9912a03" providerId="ADAL" clId="{ED8145C6-8837-4E61-BE75-6E990B7C7A62}" dt="2025-05-26T19:48:43.726" v="457" actId="20577"/>
-          <ac:spMkLst>
-            <pc:docMk/>
-            <pc:sldMk cId="2466774629" sldId="262"/>
-            <ac:spMk id="2" creationId="{174E3E04-9EB5-484F-35A5-223BB8589D7C}"/>
-          </ac:spMkLst>
-        </pc:spChg>
-        <pc:spChg chg="add mod">
-          <ac:chgData name="James Rosewell" userId="8550b6d2-134f-42e0-828f-eea3d9912a03" providerId="ADAL" clId="{ED8145C6-8837-4E61-BE75-6E990B7C7A62}" dt="2025-05-28T14:54:55.711" v="2665"/>
+          <ac:chgData name="James Rosewell" userId="8550b6d2-134f-42e0-828f-eea3d9912a03" providerId="ADAL" clId="{083B3D2E-55E6-4910-8E5F-477CC1A02799}" dt="2025-06-12T12:53:29.491" v="219" actId="1035"/>
           <ac:spMkLst>
             <pc:docMk/>
             <pc:sldMk cId="2466774629" sldId="262"/>
             <ac:spMk id="4" creationId="{2D65690D-A936-A49B-E359-68FC52DE85AE}"/>
           </ac:spMkLst>
         </pc:spChg>
-        <pc:spChg chg="add mod">
-          <ac:chgData name="James Rosewell" userId="8550b6d2-134f-42e0-828f-eea3d9912a03" providerId="ADAL" clId="{ED8145C6-8837-4E61-BE75-6E990B7C7A62}" dt="2025-05-28T14:54:44.670" v="2664"/>
-          <ac:spMkLst>
-            <pc:docMk/>
-            <pc:sldMk cId="2466774629" sldId="262"/>
-            <ac:spMk id="5" creationId="{F23FC656-C4F1-0D56-7685-2B0E444BE882}"/>
-          </ac:spMkLst>
-        </pc:spChg>
       </pc:sldChg>
-      <pc:sldChg chg="addSp delSp modSp new mod delAnim modAnim">
-        <pc:chgData name="James Rosewell" userId="8550b6d2-134f-42e0-828f-eea3d9912a03" providerId="ADAL" clId="{ED8145C6-8837-4E61-BE75-6E990B7C7A62}" dt="2025-05-26T20:12:45.174" v="2425" actId="1076"/>
-        <pc:sldMkLst>
-          <pc:docMk/>
-          <pc:sldMk cId="582025604" sldId="263"/>
-        </pc:sldMkLst>
-        <pc:spChg chg="mod">
-          <ac:chgData name="James Rosewell" userId="8550b6d2-134f-42e0-828f-eea3d9912a03" providerId="ADAL" clId="{ED8145C6-8837-4E61-BE75-6E990B7C7A62}" dt="2025-05-26T19:50:45.925" v="482" actId="20577"/>
-          <ac:spMkLst>
-            <pc:docMk/>
-            <pc:sldMk cId="582025604" sldId="263"/>
-            <ac:spMk id="2" creationId="{0CAEB0FB-D30A-E5ED-2132-AC4B866EFADC}"/>
-          </ac:spMkLst>
-        </pc:spChg>
-        <pc:spChg chg="mod">
-          <ac:chgData name="James Rosewell" userId="8550b6d2-134f-42e0-828f-eea3d9912a03" providerId="ADAL" clId="{ED8145C6-8837-4E61-BE75-6E990B7C7A62}" dt="2025-05-26T20:12:45.174" v="2425" actId="1076"/>
-          <ac:spMkLst>
-            <pc:docMk/>
-            <pc:sldMk cId="582025604" sldId="263"/>
-            <ac:spMk id="3" creationId="{DA5B673C-6C97-2638-7C93-AE0B2BBE910A}"/>
-          </ac:spMkLst>
-        </pc:spChg>
-      </pc:sldChg>
-      <pc:sldChg chg="addSp delSp modSp new mod modAnim">
-        <pc:chgData name="James Rosewell" userId="8550b6d2-134f-42e0-828f-eea3d9912a03" providerId="ADAL" clId="{ED8145C6-8837-4E61-BE75-6E990B7C7A62}" dt="2025-05-28T14:55:05.047" v="2666" actId="20577"/>
+      <pc:sldChg chg="addSp delSp modSp mod modAnim">
+        <pc:chgData name="James Rosewell" userId="8550b6d2-134f-42e0-828f-eea3d9912a03" providerId="ADAL" clId="{083B3D2E-55E6-4910-8E5F-477CC1A02799}" dt="2025-06-12T12:53:45.062" v="220"/>
         <pc:sldMkLst>
           <pc:docMk/>
           <pc:sldMk cId="360463780" sldId="264"/>
         </pc:sldMkLst>
-        <pc:spChg chg="mod">
-          <ac:chgData name="James Rosewell" userId="8550b6d2-134f-42e0-828f-eea3d9912a03" providerId="ADAL" clId="{ED8145C6-8837-4E61-BE75-6E990B7C7A62}" dt="2025-05-26T19:53:12.687" v="684" actId="20577"/>
+        <pc:spChg chg="add mod">
+          <ac:chgData name="James Rosewell" userId="8550b6d2-134f-42e0-828f-eea3d9912a03" providerId="ADAL" clId="{083B3D2E-55E6-4910-8E5F-477CC1A02799}" dt="2025-06-12T12:48:51.375" v="11" actId="1076"/>
           <ac:spMkLst>
             <pc:docMk/>
             <pc:sldMk cId="360463780" sldId="264"/>
-            <ac:spMk id="2" creationId="{6DC04045-CC2D-8CC0-5438-362EE3FA6CD2}"/>
+            <ac:spMk id="3" creationId="{D74863A2-E1C0-061D-9752-DF34E81F08BA}"/>
           </ac:spMkLst>
         </pc:spChg>
-        <pc:spChg chg="add mod">
-          <ac:chgData name="James Rosewell" userId="8550b6d2-134f-42e0-828f-eea3d9912a03" providerId="ADAL" clId="{ED8145C6-8837-4E61-BE75-6E990B7C7A62}" dt="2025-05-26T19:54:21.867" v="730" actId="164"/>
-          <ac:spMkLst>
-            <pc:docMk/>
-            <pc:sldMk cId="360463780" sldId="264"/>
-            <ac:spMk id="4" creationId="{DC90EC80-73EF-DB16-1F78-E08DAA55DDCB}"/>
-          </ac:spMkLst>
-        </pc:spChg>
-        <pc:spChg chg="add mod">
-          <ac:chgData name="James Rosewell" userId="8550b6d2-134f-42e0-828f-eea3d9912a03" providerId="ADAL" clId="{ED8145C6-8837-4E61-BE75-6E990B7C7A62}" dt="2025-05-26T19:54:21.867" v="730" actId="164"/>
-          <ac:spMkLst>
-            <pc:docMk/>
-            <pc:sldMk cId="360463780" sldId="264"/>
-            <ac:spMk id="5" creationId="{DE282281-40E9-E40E-B851-440FB7F2AA86}"/>
-          </ac:spMkLst>
-        </pc:spChg>
-        <pc:spChg chg="add mod">
-          <ac:chgData name="James Rosewell" userId="8550b6d2-134f-42e0-828f-eea3d9912a03" providerId="ADAL" clId="{ED8145C6-8837-4E61-BE75-6E990B7C7A62}" dt="2025-05-26T19:54:21.867" v="730" actId="164"/>
-          <ac:spMkLst>
-            <pc:docMk/>
-            <pc:sldMk cId="360463780" sldId="264"/>
-            <ac:spMk id="6" creationId="{1E791F32-22EF-3E9D-E6E1-0504B9A3D945}"/>
-          </ac:spMkLst>
-        </pc:spChg>
-        <pc:spChg chg="add mod">
-          <ac:chgData name="James Rosewell" userId="8550b6d2-134f-42e0-828f-eea3d9912a03" providerId="ADAL" clId="{ED8145C6-8837-4E61-BE75-6E990B7C7A62}" dt="2025-05-28T14:55:05.047" v="2666" actId="20577"/>
+        <pc:spChg chg="mod topLvl">
+          <ac:chgData name="James Rosewell" userId="8550b6d2-134f-42e0-828f-eea3d9912a03" providerId="ADAL" clId="{083B3D2E-55E6-4910-8E5F-477CC1A02799}" dt="2025-06-12T12:50:04.591" v="180" actId="115"/>
           <ac:spMkLst>
             <pc:docMk/>
             <pc:sldMk cId="360463780" sldId="264"/>
             <ac:spMk id="8" creationId="{1FDE9858-CF2E-EF50-EA0C-9E2917860EAA}"/>
           </ac:spMkLst>
         </pc:spChg>
-        <pc:grpChg chg="add mod">
-          <ac:chgData name="James Rosewell" userId="8550b6d2-134f-42e0-828f-eea3d9912a03" providerId="ADAL" clId="{ED8145C6-8837-4E61-BE75-6E990B7C7A62}" dt="2025-05-26T19:57:07.746" v="756" actId="1076"/>
-          <ac:grpSpMkLst>
-            <pc:docMk/>
-            <pc:sldMk cId="360463780" sldId="264"/>
-            <ac:grpSpMk id="7" creationId="{C2D0014E-6E73-036D-9FA8-44DE97B08AF8}"/>
-          </ac:grpSpMkLst>
-        </pc:grpChg>
-        <pc:grpChg chg="add mod">
-          <ac:chgData name="James Rosewell" userId="8550b6d2-134f-42e0-828f-eea3d9912a03" providerId="ADAL" clId="{ED8145C6-8837-4E61-BE75-6E990B7C7A62}" dt="2025-05-26T20:07:19.433" v="1966" actId="14100"/>
+        <pc:grpChg chg="del">
+          <ac:chgData name="James Rosewell" userId="8550b6d2-134f-42e0-828f-eea3d9912a03" providerId="ADAL" clId="{083B3D2E-55E6-4910-8E5F-477CC1A02799}" dt="2025-06-12T12:48:28.579" v="5" actId="165"/>
           <ac:grpSpMkLst>
             <pc:docMk/>
             <pc:sldMk cId="360463780" sldId="264"/>
             <ac:grpSpMk id="13" creationId="{F8A85276-6302-BF5D-C42C-524E7DB603F0}"/>
           </ac:grpSpMkLst>
         </pc:grpChg>
-        <pc:cxnChg chg="add mod">
-          <ac:chgData name="James Rosewell" userId="8550b6d2-134f-42e0-828f-eea3d9912a03" providerId="ADAL" clId="{ED8145C6-8837-4E61-BE75-6E990B7C7A62}" dt="2025-05-28T14:55:05.047" v="2666" actId="20577"/>
+        <pc:cxnChg chg="mod topLvl">
+          <ac:chgData name="James Rosewell" userId="8550b6d2-134f-42e0-828f-eea3d9912a03" providerId="ADAL" clId="{083B3D2E-55E6-4910-8E5F-477CC1A02799}" dt="2025-06-12T12:49:59.867" v="178" actId="6549"/>
           <ac:cxnSpMkLst>
             <pc:docMk/>
             <pc:sldMk cId="360463780" sldId="264"/>
@@ -465,37 +215,14 @@
           </ac:cxnSpMkLst>
         </pc:cxnChg>
       </pc:sldChg>
-      <pc:sldChg chg="modSp add mod">
-        <pc:chgData name="James Rosewell" userId="8550b6d2-134f-42e0-828f-eea3d9912a03" providerId="ADAL" clId="{ED8145C6-8837-4E61-BE75-6E990B7C7A62}" dt="2025-05-26T20:13:56.893" v="2544" actId="1076"/>
-        <pc:sldMkLst>
-          <pc:docMk/>
-          <pc:sldMk cId="3782825303" sldId="265"/>
-        </pc:sldMkLst>
-        <pc:spChg chg="mod">
-          <ac:chgData name="James Rosewell" userId="8550b6d2-134f-42e0-828f-eea3d9912a03" providerId="ADAL" clId="{ED8145C6-8837-4E61-BE75-6E990B7C7A62}" dt="2025-05-26T20:00:59.114" v="945" actId="20577"/>
-          <ac:spMkLst>
-            <pc:docMk/>
-            <pc:sldMk cId="3782825303" sldId="265"/>
-            <ac:spMk id="2" creationId="{6C9E3EFA-F073-738A-4D52-CFABF720A190}"/>
-          </ac:spMkLst>
-        </pc:spChg>
-        <pc:spChg chg="mod">
-          <ac:chgData name="James Rosewell" userId="8550b6d2-134f-42e0-828f-eea3d9912a03" providerId="ADAL" clId="{ED8145C6-8837-4E61-BE75-6E990B7C7A62}" dt="2025-05-26T20:13:56.893" v="2544" actId="1076"/>
-          <ac:spMkLst>
-            <pc:docMk/>
-            <pc:sldMk cId="3782825303" sldId="265"/>
-            <ac:spMk id="3" creationId="{3BA9D26E-BB63-5F0C-1B50-D1AEB1971FC5}"/>
-          </ac:spMkLst>
-        </pc:spChg>
-      </pc:sldChg>
-      <pc:sldChg chg="addSp modSp new mod">
-        <pc:chgData name="James Rosewell" userId="8550b6d2-134f-42e0-828f-eea3d9912a03" providerId="ADAL" clId="{ED8145C6-8837-4E61-BE75-6E990B7C7A62}" dt="2025-05-26T20:11:03.685" v="2314" actId="1076"/>
+      <pc:sldChg chg="modSp mod">
+        <pc:chgData name="James Rosewell" userId="8550b6d2-134f-42e0-828f-eea3d9912a03" providerId="ADAL" clId="{083B3D2E-55E6-4910-8E5F-477CC1A02799}" dt="2025-06-12T12:58:27.810" v="305" actId="20577"/>
         <pc:sldMkLst>
           <pc:docMk/>
           <pc:sldMk cId="2395730386" sldId="266"/>
         </pc:sldMkLst>
-        <pc:spChg chg="add mod">
-          <ac:chgData name="James Rosewell" userId="8550b6d2-134f-42e0-828f-eea3d9912a03" providerId="ADAL" clId="{ED8145C6-8837-4E61-BE75-6E990B7C7A62}" dt="2025-05-26T20:11:03.685" v="2314" actId="1076"/>
+        <pc:spChg chg="mod">
+          <ac:chgData name="James Rosewell" userId="8550b6d2-134f-42e0-828f-eea3d9912a03" providerId="ADAL" clId="{083B3D2E-55E6-4910-8E5F-477CC1A02799}" dt="2025-06-12T12:58:27.810" v="305" actId="20577"/>
           <ac:spMkLst>
             <pc:docMk/>
             <pc:sldMk cId="2395730386" sldId="266"/>
@@ -503,77 +230,67 @@
           </ac:spMkLst>
         </pc:spChg>
       </pc:sldChg>
-    </pc:docChg>
-  </pc:docChgLst>
-  <pc:docChgLst>
-    <pc:chgData name="James Rosewell" userId="8550b6d2-134f-42e0-828f-eea3d9912a03" providerId="ADAL" clId="{2875ECF3-9814-41FA-B05D-BFF1E0CDE6B7}"/>
-    <pc:docChg chg="modSld">
-      <pc:chgData name="James Rosewell" userId="8550b6d2-134f-42e0-828f-eea3d9912a03" providerId="ADAL" clId="{2875ECF3-9814-41FA-B05D-BFF1E0CDE6B7}" dt="2025-05-29T14:56:14.730" v="87" actId="1036"/>
-      <pc:docMkLst>
-        <pc:docMk/>
-      </pc:docMkLst>
-      <pc:sldChg chg="modSp mod">
-        <pc:chgData name="James Rosewell" userId="8550b6d2-134f-42e0-828f-eea3d9912a03" providerId="ADAL" clId="{2875ECF3-9814-41FA-B05D-BFF1E0CDE6B7}" dt="2025-05-29T14:56:14.730" v="87" actId="1036"/>
+      <pc:sldChg chg="new del">
+        <pc:chgData name="James Rosewell" userId="8550b6d2-134f-42e0-828f-eea3d9912a03" providerId="ADAL" clId="{083B3D2E-55E6-4910-8E5F-477CC1A02799}" dt="2025-06-12T12:52:29.770" v="198" actId="47"/>
         <pc:sldMkLst>
           <pc:docMk/>
-          <pc:sldMk cId="3013729455" sldId="259"/>
+          <pc:sldMk cId="2207034521" sldId="267"/>
+        </pc:sldMkLst>
+      </pc:sldChg>
+      <pc:sldChg chg="addSp delSp modSp new del mod">
+        <pc:chgData name="James Rosewell" userId="8550b6d2-134f-42e0-828f-eea3d9912a03" providerId="ADAL" clId="{083B3D2E-55E6-4910-8E5F-477CC1A02799}" dt="2025-06-12T12:52:29.770" v="198" actId="47"/>
+        <pc:sldMkLst>
+          <pc:docMk/>
+          <pc:sldMk cId="2238754150" sldId="268"/>
         </pc:sldMkLst>
         <pc:spChg chg="mod">
-          <ac:chgData name="James Rosewell" userId="8550b6d2-134f-42e0-828f-eea3d9912a03" providerId="ADAL" clId="{2875ECF3-9814-41FA-B05D-BFF1E0CDE6B7}" dt="2025-05-29T14:56:09.092" v="72" actId="14100"/>
+          <ac:chgData name="James Rosewell" userId="8550b6d2-134f-42e0-828f-eea3d9912a03" providerId="ADAL" clId="{083B3D2E-55E6-4910-8E5F-477CC1A02799}" dt="2025-06-12T12:52:21.394" v="197" actId="20577"/>
           <ac:spMkLst>
             <pc:docMk/>
-            <pc:sldMk cId="3013729455" sldId="259"/>
-            <ac:spMk id="10" creationId="{6F633549-92C7-4E3E-A9CD-C93644A0B6E6}"/>
+            <pc:sldMk cId="2238754150" sldId="268"/>
+            <ac:spMk id="2" creationId="{D211B4D7-BFDC-DC88-55AD-0E5443404D82}"/>
           </ac:spMkLst>
         </pc:spChg>
-        <pc:spChg chg="mod">
-          <ac:chgData name="James Rosewell" userId="8550b6d2-134f-42e0-828f-eea3d9912a03" providerId="ADAL" clId="{2875ECF3-9814-41FA-B05D-BFF1E0CDE6B7}" dt="2025-05-29T14:56:14.730" v="87" actId="1036"/>
+        <pc:spChg chg="add del mod">
+          <ac:chgData name="James Rosewell" userId="8550b6d2-134f-42e0-828f-eea3d9912a03" providerId="ADAL" clId="{083B3D2E-55E6-4910-8E5F-477CC1A02799}" dt="2025-06-12T12:52:05.955" v="195" actId="21"/>
           <ac:spMkLst>
             <pc:docMk/>
-            <pc:sldMk cId="3013729455" sldId="259"/>
-            <ac:spMk id="15" creationId="{507D4A9B-B4E3-7472-63E8-15B961BEB1D4}"/>
+            <pc:sldMk cId="2238754150" sldId="268"/>
+            <ac:spMk id="3" creationId="{43CF243F-DDB4-0249-57AB-742BE3D5BA3C}"/>
           </ac:spMkLst>
         </pc:spChg>
-        <pc:spChg chg="mod">
-          <ac:chgData name="James Rosewell" userId="8550b6d2-134f-42e0-828f-eea3d9912a03" providerId="ADAL" clId="{2875ECF3-9814-41FA-B05D-BFF1E0CDE6B7}" dt="2025-05-29T14:56:14.730" v="87" actId="1036"/>
+        <pc:spChg chg="del mod">
+          <ac:chgData name="James Rosewell" userId="8550b6d2-134f-42e0-828f-eea3d9912a03" providerId="ADAL" clId="{083B3D2E-55E6-4910-8E5F-477CC1A02799}" dt="2025-06-12T12:51:36.514" v="186" actId="478"/>
           <ac:spMkLst>
             <pc:docMk/>
-            <pc:sldMk cId="3013729455" sldId="259"/>
-            <ac:spMk id="16" creationId="{2E3F8A2E-F1EE-0D46-B9B5-CBF59A5A50D7}"/>
+            <pc:sldMk cId="2238754150" sldId="268"/>
+            <ac:spMk id="4" creationId="{6D5D429E-061D-7380-A030-0FF3A0A56637}"/>
           </ac:spMkLst>
         </pc:spChg>
-        <pc:grpChg chg="mod">
-          <ac:chgData name="James Rosewell" userId="8550b6d2-134f-42e0-828f-eea3d9912a03" providerId="ADAL" clId="{2875ECF3-9814-41FA-B05D-BFF1E0CDE6B7}" dt="2025-05-29T14:56:14.730" v="87" actId="1036"/>
-          <ac:grpSpMkLst>
-            <pc:docMk/>
-            <pc:sldMk cId="3013729455" sldId="259"/>
-            <ac:grpSpMk id="12" creationId="{90FC1CD7-94EA-4E62-09A3-7658FCAFB65B}"/>
-          </ac:grpSpMkLst>
-        </pc:grpChg>
-        <pc:grpChg chg="mod">
-          <ac:chgData name="James Rosewell" userId="8550b6d2-134f-42e0-828f-eea3d9912a03" providerId="ADAL" clId="{2875ECF3-9814-41FA-B05D-BFF1E0CDE6B7}" dt="2025-05-29T14:56:14.730" v="87" actId="1036"/>
-          <ac:grpSpMkLst>
-            <pc:docMk/>
-            <pc:sldMk cId="3013729455" sldId="259"/>
-            <ac:grpSpMk id="13" creationId="{A30B2D29-AF8C-F418-D401-C9F555C55D37}"/>
-          </ac:grpSpMkLst>
-        </pc:grpChg>
-      </pc:sldChg>
-      <pc:sldChg chg="modSp mod">
-        <pc:chgData name="James Rosewell" userId="8550b6d2-134f-42e0-828f-eea3d9912a03" providerId="ADAL" clId="{2875ECF3-9814-41FA-B05D-BFF1E0CDE6B7}" dt="2025-05-29T14:54:54.991" v="69" actId="6549"/>
-        <pc:sldMkLst>
-          <pc:docMk/>
-          <pc:sldMk cId="2395730386" sldId="266"/>
-        </pc:sldMkLst>
-        <pc:spChg chg="mod">
-          <ac:chgData name="James Rosewell" userId="8550b6d2-134f-42e0-828f-eea3d9912a03" providerId="ADAL" clId="{2875ECF3-9814-41FA-B05D-BFF1E0CDE6B7}" dt="2025-05-29T14:54:54.991" v="69" actId="6549"/>
+        <pc:spChg chg="add del mod">
+          <ac:chgData name="James Rosewell" userId="8550b6d2-134f-42e0-828f-eea3d9912a03" providerId="ADAL" clId="{083B3D2E-55E6-4910-8E5F-477CC1A02799}" dt="2025-06-12T12:52:05.955" v="195" actId="21"/>
           <ac:spMkLst>
             <pc:docMk/>
-            <pc:sldMk cId="2395730386" sldId="266"/>
-            <ac:spMk id="2" creationId="{20C9284E-A7AE-0229-876A-0C51A845ADEF}"/>
+            <pc:sldMk cId="2238754150" sldId="268"/>
+            <ac:spMk id="6" creationId="{C6385EE7-9CBC-FD01-A3A6-ED3BC440BF5F}"/>
           </ac:spMkLst>
         </pc:spChg>
       </pc:sldChg>
+      <pc:sldMasterChg chg="addSp modSp">
+        <pc:chgData name="James Rosewell" userId="8550b6d2-134f-42e0-828f-eea3d9912a03" providerId="ADAL" clId="{083B3D2E-55E6-4910-8E5F-477CC1A02799}" dt="2025-06-12T12:53:02.406" v="204"/>
+        <pc:sldMasterMkLst>
+          <pc:docMk/>
+          <pc:sldMasterMk cId="3561636792" sldId="2147483648"/>
+        </pc:sldMasterMkLst>
+        <pc:spChg chg="add mod">
+          <ac:chgData name="James Rosewell" userId="8550b6d2-134f-42e0-828f-eea3d9912a03" providerId="ADAL" clId="{083B3D2E-55E6-4910-8E5F-477CC1A02799}" dt="2025-06-12T12:53:02.406" v="204"/>
+          <ac:spMkLst>
+            <pc:docMk/>
+            <pc:sldMasterMk cId="3561636792" sldId="2147483648"/>
+            <ac:spMk id="7" creationId="{DC1A8E4C-AC58-1BF6-B8E4-1486456CDBB2}"/>
+          </ac:spMkLst>
+        </pc:spChg>
+      </pc:sldMasterChg>
     </pc:docChg>
   </pc:docChgLst>
 </pc:chgInfo>
@@ -726,7 +443,7 @@
           <a:p>
             <a:fld id="{85FB53F6-22E3-4A26-9535-E0AAE723734F}" type="datetimeFigureOut">
               <a:rPr lang="en-GB" smtClean="0"/>
-              <a:t>02/06/2025</a:t>
+              <a:t>12/06/2025</a:t>
             </a:fld>
             <a:endParaRPr lang="en-GB"/>
           </a:p>
@@ -924,7 +641,7 @@
           <a:p>
             <a:fld id="{85FB53F6-22E3-4A26-9535-E0AAE723734F}" type="datetimeFigureOut">
               <a:rPr lang="en-GB" smtClean="0"/>
-              <a:t>02/06/2025</a:t>
+              <a:t>12/06/2025</a:t>
             </a:fld>
             <a:endParaRPr lang="en-GB"/>
           </a:p>
@@ -1132,7 +849,7 @@
           <a:p>
             <a:fld id="{85FB53F6-22E3-4A26-9535-E0AAE723734F}" type="datetimeFigureOut">
               <a:rPr lang="en-GB" smtClean="0"/>
-              <a:t>02/06/2025</a:t>
+              <a:t>12/06/2025</a:t>
             </a:fld>
             <a:endParaRPr lang="en-GB"/>
           </a:p>
@@ -1330,7 +1047,7 @@
           <a:p>
             <a:fld id="{85FB53F6-22E3-4A26-9535-E0AAE723734F}" type="datetimeFigureOut">
               <a:rPr lang="en-GB" smtClean="0"/>
-              <a:t>02/06/2025</a:t>
+              <a:t>12/06/2025</a:t>
             </a:fld>
             <a:endParaRPr lang="en-GB"/>
           </a:p>
@@ -1605,7 +1322,7 @@
           <a:p>
             <a:fld id="{85FB53F6-22E3-4A26-9535-E0AAE723734F}" type="datetimeFigureOut">
               <a:rPr lang="en-GB" smtClean="0"/>
-              <a:t>02/06/2025</a:t>
+              <a:t>12/06/2025</a:t>
             </a:fld>
             <a:endParaRPr lang="en-GB"/>
           </a:p>
@@ -1870,7 +1587,7 @@
           <a:p>
             <a:fld id="{85FB53F6-22E3-4A26-9535-E0AAE723734F}" type="datetimeFigureOut">
               <a:rPr lang="en-GB" smtClean="0"/>
-              <a:t>02/06/2025</a:t>
+              <a:t>12/06/2025</a:t>
             </a:fld>
             <a:endParaRPr lang="en-GB"/>
           </a:p>
@@ -2282,7 +1999,7 @@
           <a:p>
             <a:fld id="{85FB53F6-22E3-4A26-9535-E0AAE723734F}" type="datetimeFigureOut">
               <a:rPr lang="en-GB" smtClean="0"/>
-              <a:t>02/06/2025</a:t>
+              <a:t>12/06/2025</a:t>
             </a:fld>
             <a:endParaRPr lang="en-GB"/>
           </a:p>
@@ -2423,7 +2140,7 @@
           <a:p>
             <a:fld id="{85FB53F6-22E3-4A26-9535-E0AAE723734F}" type="datetimeFigureOut">
               <a:rPr lang="en-GB" smtClean="0"/>
-              <a:t>02/06/2025</a:t>
+              <a:t>12/06/2025</a:t>
             </a:fld>
             <a:endParaRPr lang="en-GB"/>
           </a:p>
@@ -2536,7 +2253,7 @@
           <a:p>
             <a:fld id="{85FB53F6-22E3-4A26-9535-E0AAE723734F}" type="datetimeFigureOut">
               <a:rPr lang="en-GB" smtClean="0"/>
-              <a:t>02/06/2025</a:t>
+              <a:t>12/06/2025</a:t>
             </a:fld>
             <a:endParaRPr lang="en-GB"/>
           </a:p>
@@ -2847,7 +2564,7 @@
           <a:p>
             <a:fld id="{85FB53F6-22E3-4A26-9535-E0AAE723734F}" type="datetimeFigureOut">
               <a:rPr lang="en-GB" smtClean="0"/>
-              <a:t>02/06/2025</a:t>
+              <a:t>12/06/2025</a:t>
             </a:fld>
             <a:endParaRPr lang="en-GB"/>
           </a:p>
@@ -3135,7 +2852,7 @@
           <a:p>
             <a:fld id="{85FB53F6-22E3-4A26-9535-E0AAE723734F}" type="datetimeFigureOut">
               <a:rPr lang="en-GB" smtClean="0"/>
-              <a:t>02/06/2025</a:t>
+              <a:t>12/06/2025</a:t>
             </a:fld>
             <a:endParaRPr lang="en-GB"/>
           </a:p>
@@ -3376,7 +3093,7 @@
           <a:p>
             <a:fld id="{85FB53F6-22E3-4A26-9535-E0AAE723734F}" type="datetimeFigureOut">
               <a:rPr lang="en-GB" smtClean="0"/>
-              <a:t>02/06/2025</a:t>
+              <a:t>12/06/2025</a:t>
             </a:fld>
             <a:endParaRPr lang="en-GB"/>
           </a:p>
@@ -3469,6 +3186,44 @@
               <a:t>‹#›</a:t>
             </a:fld>
             <a:endParaRPr lang="en-GB"/>
+          </a:p>
+        </p:txBody>
+      </p:sp>
+      <p:sp>
+        <p:nvSpPr>
+          <p:cNvPr id="7" name="TextBox 6">
+            <a:extLst>
+              <a:ext uri="{FF2B5EF4-FFF2-40B4-BE49-F238E27FC236}">
+                <a16:creationId xmlns:a16="http://schemas.microsoft.com/office/drawing/2014/main" id="{DC1A8E4C-AC58-1BF6-B8E4-1486456CDBB2}"/>
+              </a:ext>
+            </a:extLst>
+          </p:cNvPr>
+          <p:cNvSpPr txBox="1"/>
+          <p:nvPr userDrawn="1"/>
+        </p:nvSpPr>
+        <p:spPr>
+          <a:xfrm>
+            <a:off x="194310" y="6344150"/>
+            <a:ext cx="6094476" cy="369332"/>
+          </a:xfrm>
+          <a:prstGeom prst="rect">
+            <a:avLst/>
+          </a:prstGeom>
+          <a:noFill/>
+        </p:spPr>
+        <p:txBody>
+          <a:bodyPr wrap="square">
+            <a:spAutoFit/>
+          </a:bodyPr>
+          <a:lstStyle/>
+          <a:p>
+            <a:r>
+              <a:rPr lang="en-GB" dirty="0">
+                <a:hlinkClick r:id="rId13"/>
+              </a:rPr>
+              <a:t>https://github.com/jwrosewell/data-labels</a:t>
+            </a:r>
+            <a:endParaRPr lang="en-GB" dirty="0"/>
           </a:p>
         </p:txBody>
       </p:sp>
@@ -3898,7 +3653,7 @@
         <p:spPr>
           <a:xfrm>
             <a:off x="1920240" y="2305615"/>
-            <a:ext cx="8839200" cy="2246769"/>
+            <a:ext cx="8839200" cy="2677656"/>
           </a:xfrm>
           <a:prstGeom prst="rect">
             <a:avLst/>
@@ -3913,13 +3668,16 @@
           <a:p>
             <a:r>
               <a:rPr lang="en-GB" sz="2800" dirty="0"/>
-              <a:t>We added an S to HTTP.</a:t>
-            </a:r>
+              <a:t>We added a 🔒 for security.</a:t>
+            </a:r>
+          </a:p>
+          <a:p>
+            <a:endParaRPr lang="en-GB" sz="2800" dirty="0"/>
           </a:p>
           <a:p>
             <a:r>
               <a:rPr lang="en-GB" sz="2800" dirty="0"/>
-              <a:t>Let’s upgrade interoperability using a multi-discipline approach.</a:t>
+              <a:t>Let’s add a data🏷️ to interoperability and privacy using a multi-discipline approach.</a:t>
             </a:r>
           </a:p>
           <a:p>
@@ -5100,7 +4858,7 @@
         </p:nvSpPr>
         <p:spPr>
           <a:xfrm>
-            <a:off x="1551710" y="3244334"/>
+            <a:off x="1551709" y="3244334"/>
             <a:ext cx="9476508" cy="369332"/>
           </a:xfrm>
           <a:prstGeom prst="rect">
@@ -5525,136 +5283,165 @@
           </p:txBody>
         </p:sp>
       </p:grpSp>
-      <p:grpSp>
-        <p:nvGrpSpPr>
-          <p:cNvPr id="13" name="Group 12">
-            <a:extLst>
-              <a:ext uri="{FF2B5EF4-FFF2-40B4-BE49-F238E27FC236}">
-                <a16:creationId xmlns:a16="http://schemas.microsoft.com/office/drawing/2014/main" id="{F8A85276-6302-BF5D-C42C-524E7DB603F0}"/>
-              </a:ext>
-            </a:extLst>
-          </p:cNvPr>
-          <p:cNvGrpSpPr/>
+      <p:sp>
+        <p:nvSpPr>
+          <p:cNvPr id="8" name="TextBox 7">
+            <a:extLst>
+              <a:ext uri="{FF2B5EF4-FFF2-40B4-BE49-F238E27FC236}">
+                <a16:creationId xmlns:a16="http://schemas.microsoft.com/office/drawing/2014/main" id="{1FDE9858-CF2E-EF50-EA0C-9E2917860EAA}"/>
+              </a:ext>
+            </a:extLst>
+          </p:cNvPr>
+          <p:cNvSpPr txBox="1"/>
           <p:nvPr/>
-        </p:nvGrpSpPr>
-        <p:grpSpPr>
+        </p:nvSpPr>
+        <p:spPr>
           <a:xfrm>
-            <a:off x="3482109" y="3349178"/>
-            <a:ext cx="7354993" cy="761003"/>
-            <a:chOff x="3499867" y="3349179"/>
-            <a:chExt cx="7337235" cy="696348"/>
+            <a:off x="6003508" y="3349178"/>
+            <a:ext cx="4833594" cy="646331"/>
           </a:xfrm>
-        </p:grpSpPr>
-        <p:sp>
-          <p:nvSpPr>
-            <p:cNvPr id="8" name="TextBox 7">
-              <a:extLst>
-                <a:ext uri="{FF2B5EF4-FFF2-40B4-BE49-F238E27FC236}">
-                  <a16:creationId xmlns:a16="http://schemas.microsoft.com/office/drawing/2014/main" id="{1FDE9858-CF2E-EF50-EA0C-9E2917860EAA}"/>
-                </a:ext>
-              </a:extLst>
-            </p:cNvPr>
-            <p:cNvSpPr txBox="1"/>
-            <p:nvPr/>
-          </p:nvSpPr>
-          <p:spPr>
-            <a:xfrm>
-              <a:off x="6015178" y="3349179"/>
-              <a:ext cx="4821924" cy="591419"/>
-            </a:xfrm>
-            <a:prstGeom prst="rect">
-              <a:avLst/>
-            </a:prstGeom>
-            <a:noFill/>
-          </p:spPr>
-          <p:txBody>
-            <a:bodyPr wrap="square">
-              <a:spAutoFit/>
-            </a:bodyPr>
-            <a:lstStyle/>
-            <a:p>
-              <a:pPr algn="ctr"/>
-              <a:r>
-                <a:rPr lang="en-US" sz="1800" kern="100" dirty="0">
-                  <a:effectLst/>
-                  <a:latin typeface="Courier New" panose="02070309020205020404" pitchFamily="49" charset="0"/>
-                  <a:ea typeface="Aptos" panose="020B0004020202020204" pitchFamily="34" charset="0"/>
-                  <a:cs typeface="Arial" panose="020B0604020202020204" pitchFamily="34" charset="0"/>
-                </a:rPr>
-                <a:t>content-security-policy: </a:t>
-              </a:r>
-              <a:r>
-                <a:rPr lang="en-US" sz="1800" b="1" u="sng" kern="100" dirty="0" err="1">
-                  <a:effectLst/>
-                  <a:latin typeface="Courier New" panose="02070309020205020404" pitchFamily="49" charset="0"/>
-                  <a:ea typeface="Aptos" panose="020B0004020202020204" pitchFamily="34" charset="0"/>
-                  <a:cs typeface="Arial" panose="020B0604020202020204" pitchFamily="34" charset="0"/>
-                </a:rPr>
-                <a:t>lbu-src</a:t>
-              </a:r>
-              <a:r>
-                <a:rPr lang="en-US" sz="1800" b="1" u="sng" kern="100" dirty="0">
-                  <a:effectLst/>
-                  <a:latin typeface="Courier New" panose="02070309020205020404" pitchFamily="49" charset="0"/>
-                  <a:ea typeface="Aptos" panose="020B0004020202020204" pitchFamily="34" charset="0"/>
-                  <a:cs typeface="Arial" panose="020B0604020202020204" pitchFamily="34" charset="0"/>
-                </a:rPr>
-                <a:t> https://ex.io/eu-ads-v1.html;</a:t>
-              </a:r>
-              <a:endParaRPr lang="en-GB" sz="1800" b="1" u="sng" kern="100" dirty="0">
+          <a:prstGeom prst="rect">
+            <a:avLst/>
+          </a:prstGeom>
+          <a:noFill/>
+        </p:spPr>
+        <p:txBody>
+          <a:bodyPr wrap="square">
+            <a:spAutoFit/>
+          </a:bodyPr>
+          <a:lstStyle/>
+          <a:p>
+            <a:pPr algn="ctr"/>
+            <a:r>
+              <a:rPr lang="en-GB" sz="1800" b="1" u="sng" kern="100" dirty="0">
                 <a:effectLst/>
                 <a:latin typeface="Aptos" panose="020B0004020202020204" pitchFamily="34" charset="0"/>
                 <a:ea typeface="Aptos" panose="020B0004020202020204" pitchFamily="34" charset="0"/>
                 <a:cs typeface="Arial" panose="020B0604020202020204" pitchFamily="34" charset="0"/>
-              </a:endParaRPr>
-            </a:p>
-          </p:txBody>
-        </p:sp>
-        <p:cxnSp>
-          <p:nvCxnSpPr>
-            <p:cNvPr id="12" name="Straight Arrow Connector 11">
-              <a:extLst>
-                <a:ext uri="{FF2B5EF4-FFF2-40B4-BE49-F238E27FC236}">
-                  <a16:creationId xmlns:a16="http://schemas.microsoft.com/office/drawing/2014/main" id="{9D481230-9485-9B34-9A40-63D0E1D4645B}"/>
-                </a:ext>
-              </a:extLst>
-            </p:cNvPr>
-            <p:cNvCxnSpPr>
-              <a:endCxn id="8" idx="1"/>
-            </p:cNvCxnSpPr>
-            <p:nvPr/>
-          </p:nvCxnSpPr>
-          <p:spPr>
-            <a:xfrm flipV="1">
-              <a:off x="3499867" y="3644889"/>
-              <a:ext cx="2515311" cy="400638"/>
-            </a:xfrm>
-            <a:prstGeom prst="straightConnector1">
-              <a:avLst/>
-            </a:prstGeom>
-            <a:ln>
-              <a:solidFill>
-                <a:schemeClr val="tx1"/>
-              </a:solidFill>
-              <a:tailEnd type="triangle"/>
-            </a:ln>
-          </p:spPr>
-          <p:style>
-            <a:lnRef idx="2">
-              <a:schemeClr val="accent1"/>
-            </a:lnRef>
-            <a:fillRef idx="0">
-              <a:schemeClr val="accent1"/>
-            </a:fillRef>
-            <a:effectRef idx="1">
-              <a:schemeClr val="accent1"/>
-            </a:effectRef>
-            <a:fontRef idx="minor">
+              </a:rPr>
+              <a:t>ONLY</a:t>
+            </a:r>
+            <a:r>
+              <a:rPr lang="en-GB" sz="1800" kern="100" dirty="0">
+                <a:effectLst/>
+                <a:latin typeface="Aptos" panose="020B0004020202020204" pitchFamily="34" charset="0"/>
+                <a:ea typeface="Aptos" panose="020B0004020202020204" pitchFamily="34" charset="0"/>
+                <a:cs typeface="Arial" panose="020B0604020202020204" pitchFamily="34" charset="0"/>
+              </a:rPr>
+              <a:t> cookies with labels that the suppliers and publishers have agreed on can be retrieved</a:t>
+            </a:r>
+          </a:p>
+        </p:txBody>
+      </p:sp>
+      <p:cxnSp>
+        <p:nvCxnSpPr>
+          <p:cNvPr id="12" name="Straight Arrow Connector 11">
+            <a:extLst>
+              <a:ext uri="{FF2B5EF4-FFF2-40B4-BE49-F238E27FC236}">
+                <a16:creationId xmlns:a16="http://schemas.microsoft.com/office/drawing/2014/main" id="{9D481230-9485-9B34-9A40-63D0E1D4645B}"/>
+              </a:ext>
+            </a:extLst>
+          </p:cNvPr>
+          <p:cNvCxnSpPr>
+            <a:endCxn id="8" idx="1"/>
+          </p:cNvCxnSpPr>
+          <p:nvPr/>
+        </p:nvCxnSpPr>
+        <p:spPr>
+          <a:xfrm flipV="1">
+            <a:off x="3482109" y="3672344"/>
+            <a:ext cx="2521399" cy="437837"/>
+          </a:xfrm>
+          <a:prstGeom prst="straightConnector1">
+            <a:avLst/>
+          </a:prstGeom>
+          <a:ln>
+            <a:solidFill>
               <a:schemeClr val="tx1"/>
-            </a:fontRef>
-          </p:style>
-        </p:cxnSp>
-      </p:grpSp>
+            </a:solidFill>
+            <a:tailEnd type="triangle"/>
+          </a:ln>
+        </p:spPr>
+        <p:style>
+          <a:lnRef idx="2">
+            <a:schemeClr val="accent1"/>
+          </a:lnRef>
+          <a:fillRef idx="0">
+            <a:schemeClr val="accent1"/>
+          </a:fillRef>
+          <a:effectRef idx="1">
+            <a:schemeClr val="accent1"/>
+          </a:effectRef>
+          <a:fontRef idx="minor">
+            <a:schemeClr val="tx1"/>
+          </a:fontRef>
+        </p:style>
+      </p:cxnSp>
+      <p:sp>
+        <p:nvSpPr>
+          <p:cNvPr id="3" name="TextBox 2">
+            <a:extLst>
+              <a:ext uri="{FF2B5EF4-FFF2-40B4-BE49-F238E27FC236}">
+                <a16:creationId xmlns:a16="http://schemas.microsoft.com/office/drawing/2014/main" id="{D74863A2-E1C0-061D-9752-DF34E81F08BA}"/>
+              </a:ext>
+            </a:extLst>
+          </p:cNvPr>
+          <p:cNvSpPr txBox="1"/>
+          <p:nvPr/>
+        </p:nvSpPr>
+        <p:spPr>
+          <a:xfrm>
+            <a:off x="5969824" y="5147498"/>
+            <a:ext cx="4833594" cy="646331"/>
+          </a:xfrm>
+          <a:prstGeom prst="rect">
+            <a:avLst/>
+          </a:prstGeom>
+          <a:noFill/>
+        </p:spPr>
+        <p:txBody>
+          <a:bodyPr wrap="square">
+            <a:spAutoFit/>
+          </a:bodyPr>
+          <a:lstStyle/>
+          <a:p>
+            <a:pPr algn="ctr"/>
+            <a:r>
+              <a:rPr lang="en-US" sz="1800" kern="100" dirty="0">
+                <a:effectLst/>
+                <a:latin typeface="Courier New" panose="02070309020205020404" pitchFamily="49" charset="0"/>
+                <a:ea typeface="Aptos" panose="020B0004020202020204" pitchFamily="34" charset="0"/>
+                <a:cs typeface="Arial" panose="020B0604020202020204" pitchFamily="34" charset="0"/>
+              </a:rPr>
+              <a:t>content-security-policy: </a:t>
+            </a:r>
+            <a:r>
+              <a:rPr lang="en-US" sz="1800" b="1" u="sng" kern="100" dirty="0" err="1">
+                <a:effectLst/>
+                <a:latin typeface="Courier New" panose="02070309020205020404" pitchFamily="49" charset="0"/>
+                <a:ea typeface="Aptos" panose="020B0004020202020204" pitchFamily="34" charset="0"/>
+                <a:cs typeface="Arial" panose="020B0604020202020204" pitchFamily="34" charset="0"/>
+              </a:rPr>
+              <a:t>lbu-src</a:t>
+            </a:r>
+            <a:r>
+              <a:rPr lang="en-US" sz="1800" b="1" u="sng" kern="100" dirty="0">
+                <a:effectLst/>
+                <a:latin typeface="Courier New" panose="02070309020205020404" pitchFamily="49" charset="0"/>
+                <a:ea typeface="Aptos" panose="020B0004020202020204" pitchFamily="34" charset="0"/>
+                <a:cs typeface="Arial" panose="020B0604020202020204" pitchFamily="34" charset="0"/>
+              </a:rPr>
+              <a:t> https://ex.io/eu-ads-v1.html;</a:t>
+            </a:r>
+            <a:endParaRPr lang="en-GB" sz="1800" b="1" u="sng" kern="100" dirty="0">
+              <a:effectLst/>
+              <a:latin typeface="Aptos" panose="020B0004020202020204" pitchFamily="34" charset="0"/>
+              <a:ea typeface="Aptos" panose="020B0004020202020204" pitchFamily="34" charset="0"/>
+              <a:cs typeface="Arial" panose="020B0604020202020204" pitchFamily="34" charset="0"/>
+            </a:endParaRPr>
+          </a:p>
+        </p:txBody>
+      </p:sp>
     </p:spTree>
     <p:extLst>
       <p:ext uri="{BB962C8B-B14F-4D97-AF65-F5344CB8AC3E}">
@@ -5686,7 +5473,7 @@
                             </p:stCondLst>
                             <p:childTnLst>
                               <p:par>
-                                <p:cTn id="5" presetID="1" presetClass="entr" presetSubtype="0" fill="hold" nodeType="clickEffect">
+                                <p:cTn id="5" presetID="1" presetClass="entr" presetSubtype="0" fill="hold" grpId="0" nodeType="clickEffect">
                                   <p:stCondLst>
                                     <p:cond delay="0"/>
                                   </p:stCondLst>
@@ -5699,7 +5486,7 @@
                                           </p:stCondLst>
                                         </p:cTn>
                                         <p:tgtEl>
-                                          <p:spTgt spid="13"/>
+                                          <p:spTgt spid="3"/>
                                         </p:tgtEl>
                                         <p:attrNameLst>
                                           <p:attrName>style.visibility</p:attrName>
@@ -5739,6 +5526,9 @@
         </p:cTn>
       </p:par>
     </p:tnLst>
+    <p:bldLst>
+      <p:bldP spid="3" grpId="0"/>
+    </p:bldLst>
   </p:timing>
 </p:sld>
 </file>
@@ -5803,7 +5593,7 @@
         </p:nvSpPr>
         <p:spPr>
           <a:xfrm>
-            <a:off x="932873" y="1594070"/>
+            <a:off x="932873" y="1456910"/>
             <a:ext cx="6096000" cy="4801314"/>
           </a:xfrm>
           <a:prstGeom prst="rect">

</xml_diff>